<commit_message>
modified day 3 lecture slides
</commit_message>
<xml_diff>
--- a/Day_3/Lectures/Day_3_Lecture_Feature_Engineering_Scaling_Selection.pptx
+++ b/Day_3/Lectures/Day_3_Lecture_Feature_Engineering_Scaling_Selection.pptx
@@ -4355,7 +4355,7 @@
       </p:grpSpPr>
       <p:sp>
         <p:nvSpPr>
-          <p:cNvPr id="447" name="Google Shape;447;g11ba4d756e5_0_0:notes"/>
+          <p:cNvPr id="447" name="Google Shape;447;g11fd74b840e_1_0:notes"/>
           <p:cNvSpPr/>
           <p:nvPr>
             <p:ph idx="2" type="sldImg"/>
@@ -4390,7 +4390,7 @@
       </p:sp>
       <p:sp>
         <p:nvSpPr>
-          <p:cNvPr id="448" name="Google Shape;448;g11ba4d756e5_0_0:notes"/>
+          <p:cNvPr id="448" name="Google Shape;448;g11fd74b840e_1_0:notes"/>
           <p:cNvSpPr txBox="1"/>
           <p:nvPr>
             <p:ph idx="1" type="body"/>
@@ -15757,7 +15757,7 @@
             <a:tbl>
               <a:tblPr>
                 <a:noFill/>
-                <a:tableStyleId>{8EA99435-CF19-4A0E-8167-C69C0BE71163}</a:tableStyleId>
+                <a:tableStyleId>{8872EBF6-F5D7-46F7-8B6D-E7110326AFF7}</a:tableStyleId>
               </a:tblPr>
               <a:tblGrid>
                 <a:gridCol w="2476175"/>
@@ -29550,7 +29550,7 @@
         <p:spPr>
           <a:xfrm>
             <a:off x="474750" y="517650"/>
-            <a:ext cx="8194500" cy="3879000"/>
+            <a:ext cx="8194500" cy="3648000"/>
           </a:xfrm>
           <a:prstGeom prst="rect">
             <a:avLst/>
@@ -29715,23 +29715,6 @@
             <a:r>
               <a:rPr lang="en" sz="1500"/>
               <a:t>It is often infeasible or intractable to simply collect more samples from the domain to improve the class distribution.</a:t>
-            </a:r>
-            <a:endParaRPr sz="1500"/>
-          </a:p>
-          <a:p>
-            <a:pPr indent="-323850" lvl="2" marL="1371600" rtl="0" algn="l">
-              <a:spcBef>
-                <a:spcPts val="0"/>
-              </a:spcBef>
-              <a:spcAft>
-                <a:spcPts val="0"/>
-              </a:spcAft>
-              <a:buSzPts val="1500"/>
-              <a:buChar char="■"/>
-            </a:pPr>
-            <a:r>
-              <a:rPr lang="en" sz="1500"/>
-              <a:t>Instead, a model is required to learn the difference between the classes.</a:t>
             </a:r>
             <a:endParaRPr sz="1500"/>
           </a:p>
@@ -29896,7 +29879,7 @@
         <p:spPr>
           <a:xfrm>
             <a:off x="474750" y="401400"/>
-            <a:ext cx="8194500" cy="4340700"/>
+            <a:ext cx="8194500" cy="3879000"/>
           </a:xfrm>
           <a:prstGeom prst="rect">
             <a:avLst/>
@@ -30009,40 +29992,6 @@
             <a:r>
               <a:rPr lang="en" sz="1500"/>
               <a:t>Oversampling: increasing the size of rare samples.</a:t>
-            </a:r>
-            <a:endParaRPr sz="1500"/>
-          </a:p>
-          <a:p>
-            <a:pPr indent="-323850" lvl="0" marL="457200" rtl="0" algn="l">
-              <a:spcBef>
-                <a:spcPts val="0"/>
-              </a:spcBef>
-              <a:spcAft>
-                <a:spcPts val="0"/>
-              </a:spcAft>
-              <a:buSzPts val="1500"/>
-              <a:buChar char="●"/>
-            </a:pPr>
-            <a:r>
-              <a:rPr lang="en" sz="1500"/>
-              <a:t>Use K-fold cross validation in the right way</a:t>
-            </a:r>
-            <a:endParaRPr sz="1500"/>
-          </a:p>
-          <a:p>
-            <a:pPr indent="-323850" lvl="1" marL="914400" rtl="0" algn="l">
-              <a:spcBef>
-                <a:spcPts val="0"/>
-              </a:spcBef>
-              <a:spcAft>
-                <a:spcPts val="0"/>
-              </a:spcAft>
-              <a:buSzPts val="1500"/>
-              <a:buChar char="○"/>
-            </a:pPr>
-            <a:r>
-              <a:rPr lang="en" sz="1500"/>
-              <a:t>Cross validation should always be done before over-sampling the data.</a:t>
             </a:r>
             <a:endParaRPr sz="1500"/>
           </a:p>
@@ -30343,7 +30292,7 @@
         <p:spPr>
           <a:xfrm>
             <a:off x="311700" y="401400"/>
-            <a:ext cx="8520600" cy="4109700"/>
+            <a:ext cx="8520600" cy="3879000"/>
           </a:xfrm>
           <a:prstGeom prst="rect">
             <a:avLst/>
@@ -30406,23 +30355,6 @@
             <a:r>
               <a:rPr lang="en" sz="1500"/>
               <a:t>It is fundamental to the field of machine learning.</a:t>
-            </a:r>
-            <a:endParaRPr sz="1500"/>
-          </a:p>
-          <a:p>
-            <a:pPr indent="-323850" lvl="1" marL="914400" rtl="0" algn="l">
-              <a:spcBef>
-                <a:spcPts val="0"/>
-              </a:spcBef>
-              <a:spcAft>
-                <a:spcPts val="0"/>
-              </a:spcAft>
-              <a:buSzPts val="1500"/>
-              <a:buChar char="○"/>
-            </a:pPr>
-            <a:r>
-              <a:rPr lang="en" sz="1500"/>
-              <a:t>Is the biggest source of difficulty for beginners, especially developers.</a:t>
             </a:r>
             <a:endParaRPr sz="1500"/>
           </a:p>
@@ -30540,7 +30472,7 @@
             </a:pPr>
             <a:r>
               <a:rPr lang="en" sz="1500"/>
-              <a:t>noisy observations, probability and statistics help us to understand and quantify the expected value, variability, of variables in our observations from the domain.</a:t>
+              <a:t>noisy observations, probability and statistics help us to understand and quantify the expected value, variability in our observations from the domain.</a:t>
             </a:r>
             <a:endParaRPr sz="1500"/>
           </a:p>

</xml_diff>